<commit_message>
Added black space around everything to avoid printing problems
</commit_message>
<xml_diff>
--- a/leaflet/brochure.pptx
+++ b/leaflet/brochure.pptx
@@ -3004,13 +3004,13 @@
               </a:ext>
             </a:extLst>
           </a:blip>
-          <a:srcRect l="15675" r="30060" b="9055"/>
+          <a:srcRect l="15675" r="30290" b="9055"/>
           <a:stretch/>
         </p:blipFill>
         <p:spPr>
           <a:xfrm>
-            <a:off x="3302758" y="6814"/>
-            <a:ext cx="6619164" cy="6237027"/>
+            <a:off x="3343814" y="91626"/>
+            <a:ext cx="6427983" cy="6082602"/>
           </a:xfrm>
           <a:prstGeom prst="rect">
             <a:avLst/>
@@ -3025,8 +3025,8 @@
         </p:nvSpPr>
         <p:spPr>
           <a:xfrm>
-            <a:off x="4258101" y="1705970"/>
-            <a:ext cx="4844956" cy="1501254"/>
+            <a:off x="4275503" y="1748712"/>
+            <a:ext cx="4724998" cy="1464084"/>
           </a:xfrm>
           <a:prstGeom prst="rect">
             <a:avLst/>
@@ -3051,8 +3051,8 @@
         </p:nvSpPr>
         <p:spPr>
           <a:xfrm>
-            <a:off x="3562065" y="438237"/>
-            <a:ext cx="6141493" cy="1838238"/>
+            <a:off x="3596701" y="512368"/>
+            <a:ext cx="5989434" cy="1792724"/>
           </a:xfrm>
           <a:prstGeom prst="roundRect">
             <a:avLst/>
@@ -3101,8 +3101,8 @@
         </p:nvSpPr>
         <p:spPr>
           <a:xfrm>
-            <a:off x="6639635" y="1091811"/>
-            <a:ext cx="2835488" cy="1015663"/>
+            <a:off x="6598072" y="1149760"/>
+            <a:ext cx="2765283" cy="990516"/>
           </a:xfrm>
           <a:prstGeom prst="rect">
             <a:avLst/>
@@ -3141,8 +3141,8 @@
         </p:nvSpPr>
         <p:spPr>
           <a:xfrm>
-            <a:off x="3777018" y="667853"/>
-            <a:ext cx="2647666" cy="1200329"/>
+            <a:off x="3806332" y="736298"/>
+            <a:ext cx="2582112" cy="1170610"/>
           </a:xfrm>
           <a:prstGeom prst="rect">
             <a:avLst/>
@@ -3175,8 +3175,8 @@
         </p:nvSpPr>
         <p:spPr>
           <a:xfrm>
-            <a:off x="0" y="6243841"/>
-            <a:ext cx="9906000" cy="614159"/>
+            <a:off x="122830" y="6174229"/>
+            <a:ext cx="9648967" cy="598953"/>
           </a:xfrm>
           <a:prstGeom prst="rect">
             <a:avLst/>
@@ -3236,8 +3236,8 @@
         </p:blipFill>
         <p:spPr bwMode="auto">
           <a:xfrm>
-            <a:off x="8170559" y="6264564"/>
-            <a:ext cx="1721794" cy="599963"/>
+            <a:off x="8063796" y="6180791"/>
+            <a:ext cx="1679164" cy="585108"/>
           </a:xfrm>
           <a:prstGeom prst="rect">
             <a:avLst/>
@@ -3275,8 +3275,8 @@
         </p:blipFill>
         <p:spPr bwMode="auto">
           <a:xfrm>
-            <a:off x="6680579" y="6289404"/>
-            <a:ext cx="518564" cy="523033"/>
+            <a:off x="6638002" y="6218664"/>
+            <a:ext cx="505725" cy="510083"/>
           </a:xfrm>
           <a:prstGeom prst="rect">
             <a:avLst/>
@@ -3301,8 +3301,8 @@
         </p:nvSpPr>
         <p:spPr>
           <a:xfrm>
-            <a:off x="0" y="0"/>
-            <a:ext cx="3332163" cy="4893647"/>
+            <a:off x="122830" y="84981"/>
+            <a:ext cx="3249661" cy="4772484"/>
           </a:xfrm>
           <a:prstGeom prst="rect">
             <a:avLst/>
@@ -3404,8 +3404,8 @@
         </p:nvSpPr>
         <p:spPr>
           <a:xfrm>
-            <a:off x="3332162" y="6280155"/>
-            <a:ext cx="3307473" cy="553998"/>
+            <a:off x="3372490" y="6209644"/>
+            <a:ext cx="3225582" cy="540281"/>
           </a:xfrm>
           <a:prstGeom prst="rect">
             <a:avLst/>
@@ -3466,8 +3466,8 @@
         </p:blipFill>
         <p:spPr>
           <a:xfrm>
-            <a:off x="0" y="6340292"/>
-            <a:ext cx="1637731" cy="463083"/>
+            <a:off x="122830" y="6268292"/>
+            <a:ext cx="1597182" cy="451617"/>
           </a:xfrm>
           <a:prstGeom prst="rect">
             <a:avLst/>
@@ -3482,8 +3482,8 @@
         </p:nvSpPr>
         <p:spPr>
           <a:xfrm>
-            <a:off x="6654586" y="597654"/>
-            <a:ext cx="2763672" cy="523220"/>
+            <a:off x="6612653" y="667837"/>
+            <a:ext cx="2695245" cy="510265"/>
           </a:xfrm>
           <a:prstGeom prst="rect">
             <a:avLst/>
@@ -3561,8 +3561,8 @@
         </p:nvSpPr>
         <p:spPr>
           <a:xfrm>
-            <a:off x="6221" y="4473038"/>
-            <a:ext cx="3284796" cy="2384961"/>
+            <a:off x="147461" y="4443187"/>
+            <a:ext cx="3190879" cy="2316772"/>
           </a:xfrm>
           <a:prstGeom prst="rect">
             <a:avLst/>
@@ -3621,8 +3621,8 @@
         </p:blipFill>
         <p:spPr>
           <a:xfrm>
-            <a:off x="3291017" y="4443664"/>
-            <a:ext cx="6608762" cy="2414336"/>
+            <a:off x="3338340" y="4414653"/>
+            <a:ext cx="6419809" cy="2345307"/>
           </a:xfrm>
           <a:prstGeom prst="rect">
             <a:avLst/>
@@ -3637,8 +3637,8 @@
         </p:nvSpPr>
         <p:spPr>
           <a:xfrm>
-            <a:off x="-1" y="0"/>
-            <a:ext cx="6645275" cy="2276475"/>
+            <a:off x="155065" y="98040"/>
+            <a:ext cx="6455278" cy="2211387"/>
           </a:xfrm>
           <a:prstGeom prst="rect">
             <a:avLst/>
@@ -3684,8 +3684,8 @@
         </p:nvGrpSpPr>
         <p:grpSpPr>
           <a:xfrm>
-            <a:off x="-7431" y="2276064"/>
-            <a:ext cx="6652705" cy="2214309"/>
+            <a:off x="147847" y="2309028"/>
+            <a:ext cx="6462496" cy="2150999"/>
             <a:chOff x="3297238" y="2276064"/>
             <a:chExt cx="6110705" cy="2012031"/>
           </a:xfrm>
@@ -3803,8 +3803,8 @@
         </p:nvSpPr>
         <p:spPr>
           <a:xfrm>
-            <a:off x="6866658" y="721534"/>
-            <a:ext cx="2927679" cy="1938992"/>
+            <a:off x="6811749" y="798944"/>
+            <a:ext cx="2843973" cy="1883553"/>
           </a:xfrm>
           <a:prstGeom prst="rect">
             <a:avLst/>
@@ -3887,8 +3887,8 @@
         </p:nvSpPr>
         <p:spPr>
           <a:xfrm>
-            <a:off x="-7430" y="5903892"/>
-            <a:ext cx="3292226" cy="954107"/>
+            <a:off x="134200" y="5833131"/>
+            <a:ext cx="3198097" cy="926828"/>
           </a:xfrm>
           <a:prstGeom prst="rect">
             <a:avLst/>
@@ -3998,8 +3998,8 @@
         </p:nvSpPr>
         <p:spPr>
           <a:xfrm>
-            <a:off x="252956" y="4750856"/>
-            <a:ext cx="2791326" cy="923330"/>
+            <a:off x="387141" y="4713062"/>
+            <a:ext cx="2711518" cy="896931"/>
           </a:xfrm>
           <a:prstGeom prst="rect">
             <a:avLst/>
@@ -4073,8 +4073,8 @@
         </p:nvSpPr>
         <p:spPr>
           <a:xfrm>
-            <a:off x="252956" y="222219"/>
-            <a:ext cx="5024897" cy="1938992"/>
+            <a:off x="387141" y="313905"/>
+            <a:ext cx="4881229" cy="1883553"/>
           </a:xfrm>
           <a:prstGeom prst="rect">
             <a:avLst/>
@@ -4155,8 +4155,8 @@
         </p:blipFill>
         <p:spPr bwMode="auto">
           <a:xfrm rot="10218289" flipH="1">
-            <a:off x="6547605" y="3737228"/>
-            <a:ext cx="815013" cy="912504"/>
+            <a:off x="6501818" y="3728415"/>
+            <a:ext cx="791711" cy="886414"/>
           </a:xfrm>
           <a:prstGeom prst="rect">
             <a:avLst/>
@@ -4181,8 +4181,8 @@
         </p:nvSpPr>
         <p:spPr>
           <a:xfrm>
-            <a:off x="6646906" y="3161250"/>
-            <a:ext cx="2480776" cy="369332"/>
+            <a:off x="6598280" y="3168905"/>
+            <a:ext cx="2409847" cy="358772"/>
           </a:xfrm>
           <a:prstGeom prst="rect">
             <a:avLst/>
@@ -4210,8 +4210,8 @@
         </p:nvSpPr>
         <p:spPr>
           <a:xfrm>
-            <a:off x="7135583" y="3462543"/>
-            <a:ext cx="1590692" cy="369332"/>
+            <a:off x="7072985" y="3461584"/>
+            <a:ext cx="1545212" cy="358772"/>
           </a:xfrm>
           <a:prstGeom prst="rect">
             <a:avLst/>
@@ -4238,8 +4238,8 @@
         </p:nvSpPr>
         <p:spPr>
           <a:xfrm>
-            <a:off x="7415092" y="3796098"/>
-            <a:ext cx="2405851" cy="646331"/>
+            <a:off x="7344502" y="3785602"/>
+            <a:ext cx="2337065" cy="627851"/>
           </a:xfrm>
           <a:prstGeom prst="rect">
             <a:avLst/>

</xml_diff>